<commit_message>
Reestructuracion y ppts actualizadas
</commit_message>
<xml_diff>
--- a/Material AngularJS/AngularJS - Clase 1 Segundas 30.pptx
+++ b/Material AngularJS/AngularJS - Clase 1 Segundas 30.pptx
@@ -225,7 +225,7 @@
           <a:p>
             <a:fld id="{0CB2ADE4-DA66-4D2B-AEBC-945044852B12}" type="datetimeFigureOut">
               <a:rPr lang="es-AR" smtClean="0"/>
-              <a:t>14/10/2014</a:t>
+              <a:t>15/10/2014</a:t>
             </a:fld>
             <a:endParaRPr lang="es-AR"/>
           </a:p>
@@ -7539,7 +7539,6 @@
               <a:rPr lang="en-US" dirty="0"/>
               <a:t>Filters</a:t>
             </a:r>
-            <a:endParaRPr lang="en-US" dirty="0"/>
           </a:p>
         </p:txBody>
       </p:sp>
@@ -7938,7 +7937,6 @@
               <a:rPr lang="en-US" dirty="0"/>
               <a:t>Filters</a:t>
             </a:r>
-            <a:endParaRPr lang="en-US" dirty="0"/>
           </a:p>
         </p:txBody>
       </p:sp>
@@ -8697,7 +8695,6 @@
               <a:rPr lang="en-US" dirty="0"/>
               <a:t>Filters</a:t>
             </a:r>
-            <a:endParaRPr lang="en-US" dirty="0"/>
           </a:p>
         </p:txBody>
       </p:sp>
@@ -9199,24 +9196,14 @@
               <a:t>    </a:t>
             </a:r>
             <a:r>
-              <a:rPr lang="en-US" sz="1600" dirty="0" err="1">
+              <a:rPr lang="en-US" sz="1600" dirty="0">
                 <a:solidFill>
                   <a:srgbClr val="002060"/>
                 </a:solidFill>
                 <a:latin typeface="Courier New" panose="02070309020205020404" pitchFamily="49" charset="0"/>
                 <a:cs typeface="Courier New" panose="02070309020205020404" pitchFamily="49" charset="0"/>
               </a:rPr>
-              <a:t>var</a:t>
-            </a:r>
-            <a:r>
-              <a:rPr lang="en-US" sz="1600" dirty="0">
-                <a:solidFill>
-                  <a:srgbClr val="002060"/>
-                </a:solidFill>
-                <a:latin typeface="Courier New" panose="02070309020205020404" pitchFamily="49" charset="0"/>
-                <a:cs typeface="Courier New" panose="02070309020205020404" pitchFamily="49" charset="0"/>
-              </a:rPr>
-              <a:t> </a:t>
+              <a:t>var </a:t>
             </a:r>
             <a:r>
               <a:rPr lang="en-US" sz="1600" dirty="0" err="1">
@@ -11196,7 +11183,6 @@
               <a:rPr lang="es-MX" sz="2000" dirty="0"/>
               <a:t>link</a:t>
             </a:r>
-            <a:endParaRPr lang="es-MX" sz="2000" dirty="0"/>
           </a:p>
         </p:txBody>
       </p:sp>
@@ -11263,6 +11249,13 @@
   <p:clrMapOvr>
     <a:masterClrMapping/>
   </p:clrMapOvr>
+  <p:timing>
+    <p:tnLst>
+      <p:par>
+        <p:cTn id="1" dur="indefinite" restart="never" nodeType="tmRoot"/>
+      </p:par>
+    </p:tnLst>
+  </p:timing>
 </p:sld>
 </file>
 
@@ -11830,7 +11823,6 @@
               <a:rPr lang="en-US" dirty="0"/>
               <a:t>Filters</a:t>
             </a:r>
-            <a:endParaRPr lang="en-US" dirty="0"/>
           </a:p>
         </p:txBody>
       </p:sp>
@@ -12564,7 +12556,6 @@
               <a:rPr lang="en-US" dirty="0"/>
               <a:t>Filters</a:t>
             </a:r>
-            <a:endParaRPr lang="en-US" dirty="0"/>
           </a:p>
         </p:txBody>
       </p:sp>
@@ -13159,7 +13150,6 @@
               <a:rPr lang="en-US" dirty="0"/>
               <a:t>Filters</a:t>
             </a:r>
-            <a:endParaRPr lang="en-US" dirty="0"/>
           </a:p>
         </p:txBody>
       </p:sp>
@@ -13877,7 +13867,6 @@
               <a:rPr lang="en-US" dirty="0"/>
               <a:t>Filters</a:t>
             </a:r>
-            <a:endParaRPr lang="en-US" dirty="0"/>
           </a:p>
         </p:txBody>
       </p:sp>
@@ -14625,7 +14614,6 @@
               <a:rPr lang="en-US" dirty="0"/>
               <a:t>Filters</a:t>
             </a:r>
-            <a:endParaRPr lang="en-US" dirty="0"/>
           </a:p>
         </p:txBody>
       </p:sp>
@@ -14971,7 +14959,6 @@
               <a:rPr lang="en-US" dirty="0"/>
               <a:t>Filters</a:t>
             </a:r>
-            <a:endParaRPr lang="en-US" dirty="0"/>
           </a:p>
         </p:txBody>
       </p:sp>
@@ -15213,7 +15200,7 @@
           <a:lstStyle/>
           <a:p>
             <a:r>
-              <a:rPr lang="en-US" dirty="0" err="1">
+              <a:rPr lang="en-US" dirty="0">
                 <a:solidFill>
                   <a:srgbClr val="0070C0"/>
                 </a:solidFill>
@@ -15309,7 +15296,7 @@
           </a:p>
           <a:p>
             <a:r>
-              <a:rPr lang="en-US" dirty="0" err="1">
+              <a:rPr lang="en-US" dirty="0">
                 <a:solidFill>
                   <a:srgbClr val="0070C0"/>
                 </a:solidFill>

</xml_diff>